<commit_message>
doc: add comment & fix typo
</commit_message>
<xml_diff>
--- a/UltraOOXX.pptx
+++ b/UltraOOXX.pptx
@@ -949,7 +949,7 @@
           <a:p>
             <a:fld id="{A8E206B0-F667-4457-9769-DB2660358378}" type="datetimeFigureOut">
               <a:rPr lang="zh-TW" altLang="en-US" smtClean="0"/>
-              <a:t>2020/5/22</a:t>
+              <a:t>2020/6/2</a:t>
             </a:fld>
             <a:endParaRPr lang="zh-TW" altLang="en-US"/>
           </a:p>
@@ -1200,7 +1200,7 @@
           <a:p>
             <a:fld id="{A8E206B0-F667-4457-9769-DB2660358378}" type="datetimeFigureOut">
               <a:rPr lang="zh-TW" altLang="en-US" smtClean="0"/>
-              <a:t>2020/5/22</a:t>
+              <a:t>2020/6/2</a:t>
             </a:fld>
             <a:endParaRPr lang="zh-TW" altLang="en-US"/>
           </a:p>
@@ -1514,7 +1514,7 @@
           <a:p>
             <a:fld id="{A8E206B0-F667-4457-9769-DB2660358378}" type="datetimeFigureOut">
               <a:rPr lang="zh-TW" altLang="en-US" smtClean="0"/>
-              <a:t>2020/5/22</a:t>
+              <a:t>2020/6/2</a:t>
             </a:fld>
             <a:endParaRPr lang="zh-TW" altLang="en-US"/>
           </a:p>
@@ -1847,7 +1847,7 @@
           <a:p>
             <a:fld id="{A8E206B0-F667-4457-9769-DB2660358378}" type="datetimeFigureOut">
               <a:rPr lang="zh-TW" altLang="en-US" smtClean="0"/>
-              <a:t>2020/5/22</a:t>
+              <a:t>2020/6/2</a:t>
             </a:fld>
             <a:endParaRPr lang="zh-TW" altLang="en-US"/>
           </a:p>
@@ -2161,7 +2161,7 @@
           <a:p>
             <a:fld id="{A8E206B0-F667-4457-9769-DB2660358378}" type="datetimeFigureOut">
               <a:rPr lang="zh-TW" altLang="en-US" smtClean="0"/>
-              <a:t>2020/5/22</a:t>
+              <a:t>2020/6/2</a:t>
             </a:fld>
             <a:endParaRPr lang="zh-TW" altLang="en-US"/>
           </a:p>
@@ -2554,7 +2554,7 @@
           <a:p>
             <a:fld id="{A8E206B0-F667-4457-9769-DB2660358378}" type="datetimeFigureOut">
               <a:rPr lang="zh-TW" altLang="en-US" smtClean="0"/>
-              <a:t>2020/5/22</a:t>
+              <a:t>2020/6/2</a:t>
             </a:fld>
             <a:endParaRPr lang="zh-TW" altLang="en-US"/>
           </a:p>
@@ -2724,7 +2724,7 @@
           <a:p>
             <a:fld id="{A8E206B0-F667-4457-9769-DB2660358378}" type="datetimeFigureOut">
               <a:rPr lang="zh-TW" altLang="en-US" smtClean="0"/>
-              <a:t>2020/5/22</a:t>
+              <a:t>2020/6/2</a:t>
             </a:fld>
             <a:endParaRPr lang="zh-TW" altLang="en-US"/>
           </a:p>
@@ -2904,7 +2904,7 @@
           <a:p>
             <a:fld id="{A8E206B0-F667-4457-9769-DB2660358378}" type="datetimeFigureOut">
               <a:rPr lang="zh-TW" altLang="en-US" smtClean="0"/>
-              <a:t>2020/5/22</a:t>
+              <a:t>2020/6/2</a:t>
             </a:fld>
             <a:endParaRPr lang="zh-TW" altLang="en-US"/>
           </a:p>
@@ -3074,7 +3074,7 @@
           <a:p>
             <a:fld id="{A8E206B0-F667-4457-9769-DB2660358378}" type="datetimeFigureOut">
               <a:rPr lang="zh-TW" altLang="en-US" smtClean="0"/>
-              <a:t>2020/5/22</a:t>
+              <a:t>2020/6/2</a:t>
             </a:fld>
             <a:endParaRPr lang="zh-TW" altLang="en-US"/>
           </a:p>
@@ -3321,7 +3321,7 @@
           <a:p>
             <a:fld id="{A8E206B0-F667-4457-9769-DB2660358378}" type="datetimeFigureOut">
               <a:rPr lang="zh-TW" altLang="en-US" smtClean="0"/>
-              <a:t>2020/5/22</a:t>
+              <a:t>2020/6/2</a:t>
             </a:fld>
             <a:endParaRPr lang="zh-TW" altLang="en-US"/>
           </a:p>
@@ -3618,7 +3618,7 @@
           <a:p>
             <a:fld id="{A8E206B0-F667-4457-9769-DB2660358378}" type="datetimeFigureOut">
               <a:rPr lang="zh-TW" altLang="en-US" smtClean="0"/>
-              <a:t>2020/5/22</a:t>
+              <a:t>2020/6/2</a:t>
             </a:fld>
             <a:endParaRPr lang="zh-TW" altLang="en-US"/>
           </a:p>
@@ -3997,7 +3997,7 @@
           <a:p>
             <a:fld id="{A8E206B0-F667-4457-9769-DB2660358378}" type="datetimeFigureOut">
               <a:rPr lang="zh-TW" altLang="en-US" smtClean="0"/>
-              <a:t>2020/5/22</a:t>
+              <a:t>2020/6/2</a:t>
             </a:fld>
             <a:endParaRPr lang="zh-TW" altLang="en-US"/>
           </a:p>
@@ -4120,7 +4120,7 @@
           <a:p>
             <a:fld id="{A8E206B0-F667-4457-9769-DB2660358378}" type="datetimeFigureOut">
               <a:rPr lang="zh-TW" altLang="en-US" smtClean="0"/>
-              <a:t>2020/5/22</a:t>
+              <a:t>2020/6/2</a:t>
             </a:fld>
             <a:endParaRPr lang="zh-TW" altLang="en-US"/>
           </a:p>
@@ -4215,7 +4215,7 @@
           <a:p>
             <a:fld id="{A8E206B0-F667-4457-9769-DB2660358378}" type="datetimeFigureOut">
               <a:rPr lang="zh-TW" altLang="en-US" smtClean="0"/>
-              <a:t>2020/5/22</a:t>
+              <a:t>2020/6/2</a:t>
             </a:fld>
             <a:endParaRPr lang="zh-TW" altLang="en-US"/>
           </a:p>
@@ -4470,7 +4470,7 @@
           <a:p>
             <a:fld id="{A8E206B0-F667-4457-9769-DB2660358378}" type="datetimeFigureOut">
               <a:rPr lang="zh-TW" altLang="en-US" smtClean="0"/>
-              <a:t>2020/5/22</a:t>
+              <a:t>2020/6/2</a:t>
             </a:fld>
             <a:endParaRPr lang="zh-TW" altLang="en-US"/>
           </a:p>
@@ -4733,7 +4733,7 @@
           <a:p>
             <a:fld id="{A8E206B0-F667-4457-9769-DB2660358378}" type="datetimeFigureOut">
               <a:rPr lang="zh-TW" altLang="en-US" smtClean="0"/>
-              <a:t>2020/5/22</a:t>
+              <a:t>2020/6/2</a:t>
             </a:fld>
             <a:endParaRPr lang="zh-TW" altLang="en-US"/>
           </a:p>
@@ -5547,7 +5547,7 @@
           <a:p>
             <a:fld id="{A8E206B0-F667-4457-9769-DB2660358378}" type="datetimeFigureOut">
               <a:rPr lang="zh-TW" altLang="en-US" smtClean="0"/>
-              <a:t>2020/5/22</a:t>
+              <a:t>2020/6/2</a:t>
             </a:fld>
             <a:endParaRPr lang="zh-TW" altLang="en-US"/>
           </a:p>
@@ -6385,6 +6385,20 @@
               <a:t>Code (10%)</a:t>
             </a:r>
           </a:p>
+          <a:p>
+            <a:r>
+              <a:rPr lang="en-US" altLang="zh-TW" dirty="0"/>
+              <a:t>(at </a:t>
+            </a:r>
+            <a:r>
+              <a:rPr lang="en-US" altLang="zh-TW" dirty="0" err="1"/>
+              <a:t>Game.h</a:t>
+            </a:r>
+            <a:r>
+              <a:rPr lang="en-US" altLang="zh-TW" dirty="0"/>
+              <a:t> :84)</a:t>
+            </a:r>
+          </a:p>
         </p:txBody>
       </p:sp>
       <p:pic>
@@ -6781,6 +6795,121 @@
                       </p:childTnLst>
                     </p:cTn>
                   </p:par>
+                  <p:par>
+                    <p:cTn id="25" fill="hold">
+                      <p:stCondLst>
+                        <p:cond delay="indefinite"/>
+                      </p:stCondLst>
+                      <p:childTnLst>
+                        <p:par>
+                          <p:cTn id="26" fill="hold">
+                            <p:stCondLst>
+                              <p:cond delay="0"/>
+                            </p:stCondLst>
+                            <p:childTnLst>
+                              <p:par>
+                                <p:cTn id="27" presetID="42" presetClass="entr" presetSubtype="0" fill="hold" nodeType="clickEffect">
+                                  <p:stCondLst>
+                                    <p:cond delay="0"/>
+                                  </p:stCondLst>
+                                  <p:childTnLst>
+                                    <p:set>
+                                      <p:cBhvr>
+                                        <p:cTn id="28" dur="1" fill="hold">
+                                          <p:stCondLst>
+                                            <p:cond delay="0"/>
+                                          </p:stCondLst>
+                                        </p:cTn>
+                                        <p:tgtEl>
+                                          <p:spTgt spid="3">
+                                            <p:txEl>
+                                              <p:pRg st="6" end="6"/>
+                                            </p:txEl>
+                                          </p:spTgt>
+                                        </p:tgtEl>
+                                        <p:attrNameLst>
+                                          <p:attrName>style.visibility</p:attrName>
+                                        </p:attrNameLst>
+                                      </p:cBhvr>
+                                      <p:to>
+                                        <p:strVal val="visible"/>
+                                      </p:to>
+                                    </p:set>
+                                    <p:animEffect transition="in" filter="fade">
+                                      <p:cBhvr>
+                                        <p:cTn id="29" dur="1000"/>
+                                        <p:tgtEl>
+                                          <p:spTgt spid="3">
+                                            <p:txEl>
+                                              <p:pRg st="6" end="6"/>
+                                            </p:txEl>
+                                          </p:spTgt>
+                                        </p:tgtEl>
+                                      </p:cBhvr>
+                                    </p:animEffect>
+                                    <p:anim calcmode="lin" valueType="num">
+                                      <p:cBhvr>
+                                        <p:cTn id="30" dur="1000" fill="hold"/>
+                                        <p:tgtEl>
+                                          <p:spTgt spid="3">
+                                            <p:txEl>
+                                              <p:pRg st="6" end="6"/>
+                                            </p:txEl>
+                                          </p:spTgt>
+                                        </p:tgtEl>
+                                        <p:attrNameLst>
+                                          <p:attrName>ppt_x</p:attrName>
+                                        </p:attrNameLst>
+                                      </p:cBhvr>
+                                      <p:tavLst>
+                                        <p:tav tm="0">
+                                          <p:val>
+                                            <p:strVal val="#ppt_x"/>
+                                          </p:val>
+                                        </p:tav>
+                                        <p:tav tm="100000">
+                                          <p:val>
+                                            <p:strVal val="#ppt_x"/>
+                                          </p:val>
+                                        </p:tav>
+                                      </p:tavLst>
+                                    </p:anim>
+                                    <p:anim calcmode="lin" valueType="num">
+                                      <p:cBhvr>
+                                        <p:cTn id="31" dur="1000" fill="hold"/>
+                                        <p:tgtEl>
+                                          <p:spTgt spid="3">
+                                            <p:txEl>
+                                              <p:pRg st="6" end="6"/>
+                                            </p:txEl>
+                                          </p:spTgt>
+                                        </p:tgtEl>
+                                        <p:attrNameLst>
+                                          <p:attrName>ppt_y</p:attrName>
+                                        </p:attrNameLst>
+                                      </p:cBhvr>
+                                      <p:tavLst>
+                                        <p:tav tm="0">
+                                          <p:val>
+                                            <p:strVal val="#ppt_y+.1"/>
+                                          </p:val>
+                                        </p:tav>
+                                        <p:tav tm="100000">
+                                          <p:val>
+                                            <p:strVal val="#ppt_y"/>
+                                          </p:val>
+                                        </p:tav>
+                                      </p:tavLst>
+                                    </p:anim>
+                                  </p:childTnLst>
+                                </p:cTn>
+                              </p:par>
+                            </p:childTnLst>
+                          </p:cTn>
+                        </p:par>
+                      </p:childTnLst>
+                    </p:cTn>
+                  </p:par>
                 </p:childTnLst>
               </p:cTn>
               <p:prevCondLst>
@@ -14496,7 +14625,7 @@
             </a:r>
             <a:r>
               <a:rPr lang="zh-TW" altLang="en-US" dirty="0"/>
-              <a:t>在下完一部棋之後，要檢查是否已經結束遊戲</a:t>
+              <a:t>在下完一步棋之後，要檢查是否已經結束遊戲</a:t>
             </a:r>
             <a:endParaRPr lang="en-US" altLang="zh-TW" dirty="0"/>
           </a:p>

</xml_diff>